<commit_message>
Flesh out course TOC
</commit_message>
<xml_diff>
--- a/warner-sql-slides.pptx
+++ b/warner-sql-slides.pptx
@@ -5448,7 +5448,19 @@
           <a:p>
             <a:r>
               <a:rPr lang="en-US" dirty="0"/>
-              <a:t>sdf</a:t>
+              <a:t>Microsoft Azure SQL Database Hosting Options</a:t>
+            </a:r>
+          </a:p>
+          <a:p>
+            <a:r>
+              <a:rPr lang="en-US" dirty="0"/>
+              <a:t>SQL Server to Azure Migration</a:t>
+            </a:r>
+          </a:p>
+          <a:p>
+            <a:r>
+              <a:rPr lang="en-US" dirty="0"/>
+              <a:t>Configure Database Security</a:t>
             </a:r>
           </a:p>
         </p:txBody>
@@ -5569,6 +5581,104 @@
                       </p:childTnLst>
                     </p:cTn>
                   </p:par>
+                  <p:par>
+                    <p:cTn id="11" fill="hold">
+                      <p:stCondLst>
+                        <p:cond delay="indefinite"/>
+                      </p:stCondLst>
+                      <p:childTnLst>
+                        <p:par>
+                          <p:cTn id="12" fill="hold">
+                            <p:stCondLst>
+                              <p:cond delay="0"/>
+                            </p:stCondLst>
+                            <p:childTnLst>
+                              <p:par>
+                                <p:cTn id="13" presetID="1" presetClass="entr" presetSubtype="0" fill="hold" nodeType="clickEffect">
+                                  <p:stCondLst>
+                                    <p:cond delay="0"/>
+                                  </p:stCondLst>
+                                  <p:childTnLst>
+                                    <p:set>
+                                      <p:cBhvr>
+                                        <p:cTn id="14" dur="1" fill="hold">
+                                          <p:stCondLst>
+                                            <p:cond delay="0"/>
+                                          </p:stCondLst>
+                                        </p:cTn>
+                                        <p:tgtEl>
+                                          <p:spTgt spid="3">
+                                            <p:txEl>
+                                              <p:pRg st="2" end="2"/>
+                                            </p:txEl>
+                                          </p:spTgt>
+                                        </p:tgtEl>
+                                        <p:attrNameLst>
+                                          <p:attrName>style.visibility</p:attrName>
+                                        </p:attrNameLst>
+                                      </p:cBhvr>
+                                      <p:to>
+                                        <p:strVal val="visible"/>
+                                      </p:to>
+                                    </p:set>
+                                  </p:childTnLst>
+                                </p:cTn>
+                              </p:par>
+                            </p:childTnLst>
+                          </p:cTn>
+                        </p:par>
+                      </p:childTnLst>
+                    </p:cTn>
+                  </p:par>
+                  <p:par>
+                    <p:cTn id="15" fill="hold">
+                      <p:stCondLst>
+                        <p:cond delay="indefinite"/>
+                      </p:stCondLst>
+                      <p:childTnLst>
+                        <p:par>
+                          <p:cTn id="16" fill="hold">
+                            <p:stCondLst>
+                              <p:cond delay="0"/>
+                            </p:stCondLst>
+                            <p:childTnLst>
+                              <p:par>
+                                <p:cTn id="17" presetID="1" presetClass="entr" presetSubtype="0" fill="hold" nodeType="clickEffect">
+                                  <p:stCondLst>
+                                    <p:cond delay="0"/>
+                                  </p:stCondLst>
+                                  <p:childTnLst>
+                                    <p:set>
+                                      <p:cBhvr>
+                                        <p:cTn id="18" dur="1" fill="hold">
+                                          <p:stCondLst>
+                                            <p:cond delay="0"/>
+                                          </p:stCondLst>
+                                        </p:cTn>
+                                        <p:tgtEl>
+                                          <p:spTgt spid="3">
+                                            <p:txEl>
+                                              <p:pRg st="3" end="3"/>
+                                            </p:txEl>
+                                          </p:spTgt>
+                                        </p:tgtEl>
+                                        <p:attrNameLst>
+                                          <p:attrName>style.visibility</p:attrName>
+                                        </p:attrNameLst>
+                                      </p:cBhvr>
+                                      <p:to>
+                                        <p:strVal val="visible"/>
+                                      </p:to>
+                                    </p:set>
+                                  </p:childTnLst>
+                                </p:cTn>
+                              </p:par>
+                            </p:childTnLst>
+                          </p:cTn>
+                        </p:par>
+                      </p:childTnLst>
+                    </p:cTn>
+                  </p:par>
                 </p:childTnLst>
               </p:cTn>
               <p:prevCondLst>
@@ -5667,10 +5777,25 @@
           </a:p>
           <a:p>
             <a:r>
+              <a:rPr lang="en-US" dirty="0"/>
+              <a:t>Configure Azure SQL Database High Availability and Disaster Recovery</a:t>
+            </a:r>
+          </a:p>
+          <a:p>
+            <a:r>
+              <a:rPr lang="en-US" dirty="0"/>
+              <a:t>Monitor and Optimize Azure SQL Server</a:t>
+            </a:r>
+          </a:p>
+          <a:p>
+            <a:r>
               <a:rPr lang="en-US" dirty="0" err="1"/>
-              <a:t>sadf</a:t>
-            </a:r>
-            <a:endParaRPr lang="en-US" dirty="0"/>
+              <a:t>Integate</a:t>
+            </a:r>
+            <a:r>
+              <a:rPr lang="en-US" dirty="0"/>
+              <a:t> Azure SQL Server throughout Azure</a:t>
+            </a:r>
           </a:p>
         </p:txBody>
       </p:sp>
@@ -5770,6 +5895,104 @@
                                           <p:spTgt spid="3">
                                             <p:txEl>
                                               <p:pRg st="1" end="1"/>
+                                            </p:txEl>
+                                          </p:spTgt>
+                                        </p:tgtEl>
+                                        <p:attrNameLst>
+                                          <p:attrName>style.visibility</p:attrName>
+                                        </p:attrNameLst>
+                                      </p:cBhvr>
+                                      <p:to>
+                                        <p:strVal val="visible"/>
+                                      </p:to>
+                                    </p:set>
+                                  </p:childTnLst>
+                                </p:cTn>
+                              </p:par>
+                            </p:childTnLst>
+                          </p:cTn>
+                        </p:par>
+                      </p:childTnLst>
+                    </p:cTn>
+                  </p:par>
+                  <p:par>
+                    <p:cTn id="11" fill="hold">
+                      <p:stCondLst>
+                        <p:cond delay="indefinite"/>
+                      </p:stCondLst>
+                      <p:childTnLst>
+                        <p:par>
+                          <p:cTn id="12" fill="hold">
+                            <p:stCondLst>
+                              <p:cond delay="0"/>
+                            </p:stCondLst>
+                            <p:childTnLst>
+                              <p:par>
+                                <p:cTn id="13" presetID="1" presetClass="entr" presetSubtype="0" fill="hold" nodeType="clickEffect">
+                                  <p:stCondLst>
+                                    <p:cond delay="0"/>
+                                  </p:stCondLst>
+                                  <p:childTnLst>
+                                    <p:set>
+                                      <p:cBhvr>
+                                        <p:cTn id="14" dur="1" fill="hold">
+                                          <p:stCondLst>
+                                            <p:cond delay="0"/>
+                                          </p:stCondLst>
+                                        </p:cTn>
+                                        <p:tgtEl>
+                                          <p:spTgt spid="3">
+                                            <p:txEl>
+                                              <p:pRg st="2" end="2"/>
+                                            </p:txEl>
+                                          </p:spTgt>
+                                        </p:tgtEl>
+                                        <p:attrNameLst>
+                                          <p:attrName>style.visibility</p:attrName>
+                                        </p:attrNameLst>
+                                      </p:cBhvr>
+                                      <p:to>
+                                        <p:strVal val="visible"/>
+                                      </p:to>
+                                    </p:set>
+                                  </p:childTnLst>
+                                </p:cTn>
+                              </p:par>
+                            </p:childTnLst>
+                          </p:cTn>
+                        </p:par>
+                      </p:childTnLst>
+                    </p:cTn>
+                  </p:par>
+                  <p:par>
+                    <p:cTn id="15" fill="hold">
+                      <p:stCondLst>
+                        <p:cond delay="indefinite"/>
+                      </p:stCondLst>
+                      <p:childTnLst>
+                        <p:par>
+                          <p:cTn id="16" fill="hold">
+                            <p:stCondLst>
+                              <p:cond delay="0"/>
+                            </p:stCondLst>
+                            <p:childTnLst>
+                              <p:par>
+                                <p:cTn id="17" presetID="1" presetClass="entr" presetSubtype="0" fill="hold" nodeType="clickEffect">
+                                  <p:stCondLst>
+                                    <p:cond delay="0"/>
+                                  </p:stCondLst>
+                                  <p:childTnLst>
+                                    <p:set>
+                                      <p:cBhvr>
+                                        <p:cTn id="18" dur="1" fill="hold">
+                                          <p:stCondLst>
+                                            <p:cond delay="0"/>
+                                          </p:stCondLst>
+                                        </p:cTn>
+                                        <p:tgtEl>
+                                          <p:spTgt spid="3">
+                                            <p:txEl>
+                                              <p:pRg st="3" end="3"/>
                                             </p:txEl>
                                           </p:spTgt>
                                         </p:tgtEl>

</xml_diff>